<commit_message>
Fixed trapezoidal integration, moved database code into try catch exception block, and defined step derivative
</commit_message>
<xml_diff>
--- a/AlexDubois/Updated Flowcharts.pptx
+++ b/AlexDubois/Updated Flowcharts.pptx
@@ -105,6 +105,11 @@
       </a:defRPr>
     </a:lvl9pPr>
   </p:defaultTextStyle>
+  <p:extLst>
+    <p:ext uri="{EFAFB233-063F-42B5-8137-9DF3F51BA10A}">
+      <p15:sldGuideLst xmlns:p15="http://schemas.microsoft.com/office/powerpoint/2012/main"/>
+    </p:ext>
+  </p:extLst>
 </p:presentation>
 </file>
 
@@ -239,7 +244,7 @@
           <a:p>
             <a:fld id="{603601E7-32FD-41E4-B3D9-A9D98600A68F}" type="datetimeFigureOut">
               <a:rPr lang="en-US" smtClean="0"/>
-              <a:t>9/25/2016</a:t>
+              <a:t>10/9/2016</a:t>
             </a:fld>
             <a:endParaRPr lang="en-US"/>
           </a:p>
@@ -409,7 +414,7 @@
           <a:p>
             <a:fld id="{603601E7-32FD-41E4-B3D9-A9D98600A68F}" type="datetimeFigureOut">
               <a:rPr lang="en-US" smtClean="0"/>
-              <a:t>9/25/2016</a:t>
+              <a:t>10/9/2016</a:t>
             </a:fld>
             <a:endParaRPr lang="en-US"/>
           </a:p>
@@ -589,7 +594,7 @@
           <a:p>
             <a:fld id="{603601E7-32FD-41E4-B3D9-A9D98600A68F}" type="datetimeFigureOut">
               <a:rPr lang="en-US" smtClean="0"/>
-              <a:t>9/25/2016</a:t>
+              <a:t>10/9/2016</a:t>
             </a:fld>
             <a:endParaRPr lang="en-US"/>
           </a:p>
@@ -759,7 +764,7 @@
           <a:p>
             <a:fld id="{603601E7-32FD-41E4-B3D9-A9D98600A68F}" type="datetimeFigureOut">
               <a:rPr lang="en-US" smtClean="0"/>
-              <a:t>9/25/2016</a:t>
+              <a:t>10/9/2016</a:t>
             </a:fld>
             <a:endParaRPr lang="en-US"/>
           </a:p>
@@ -1005,7 +1010,7 @@
           <a:p>
             <a:fld id="{603601E7-32FD-41E4-B3D9-A9D98600A68F}" type="datetimeFigureOut">
               <a:rPr lang="en-US" smtClean="0"/>
-              <a:t>9/25/2016</a:t>
+              <a:t>10/9/2016</a:t>
             </a:fld>
             <a:endParaRPr lang="en-US"/>
           </a:p>
@@ -1237,7 +1242,7 @@
           <a:p>
             <a:fld id="{603601E7-32FD-41E4-B3D9-A9D98600A68F}" type="datetimeFigureOut">
               <a:rPr lang="en-US" smtClean="0"/>
-              <a:t>9/25/2016</a:t>
+              <a:t>10/9/2016</a:t>
             </a:fld>
             <a:endParaRPr lang="en-US"/>
           </a:p>
@@ -1604,7 +1609,7 @@
           <a:p>
             <a:fld id="{603601E7-32FD-41E4-B3D9-A9D98600A68F}" type="datetimeFigureOut">
               <a:rPr lang="en-US" smtClean="0"/>
-              <a:t>9/25/2016</a:t>
+              <a:t>10/9/2016</a:t>
             </a:fld>
             <a:endParaRPr lang="en-US"/>
           </a:p>
@@ -1722,7 +1727,7 @@
           <a:p>
             <a:fld id="{603601E7-32FD-41E4-B3D9-A9D98600A68F}" type="datetimeFigureOut">
               <a:rPr lang="en-US" smtClean="0"/>
-              <a:t>9/25/2016</a:t>
+              <a:t>10/9/2016</a:t>
             </a:fld>
             <a:endParaRPr lang="en-US"/>
           </a:p>
@@ -1817,7 +1822,7 @@
           <a:p>
             <a:fld id="{603601E7-32FD-41E4-B3D9-A9D98600A68F}" type="datetimeFigureOut">
               <a:rPr lang="en-US" smtClean="0"/>
-              <a:t>9/25/2016</a:t>
+              <a:t>10/9/2016</a:t>
             </a:fld>
             <a:endParaRPr lang="en-US"/>
           </a:p>
@@ -2094,7 +2099,7 @@
           <a:p>
             <a:fld id="{603601E7-32FD-41E4-B3D9-A9D98600A68F}" type="datetimeFigureOut">
               <a:rPr lang="en-US" smtClean="0"/>
-              <a:t>9/25/2016</a:t>
+              <a:t>10/9/2016</a:t>
             </a:fld>
             <a:endParaRPr lang="en-US"/>
           </a:p>
@@ -2347,7 +2352,7 @@
           <a:p>
             <a:fld id="{603601E7-32FD-41E4-B3D9-A9D98600A68F}" type="datetimeFigureOut">
               <a:rPr lang="en-US" smtClean="0"/>
-              <a:t>9/25/2016</a:t>
+              <a:t>10/9/2016</a:t>
             </a:fld>
             <a:endParaRPr lang="en-US"/>
           </a:p>
@@ -2560,7 +2565,7 @@
           <a:p>
             <a:fld id="{603601E7-32FD-41E4-B3D9-A9D98600A68F}" type="datetimeFigureOut">
               <a:rPr lang="en-US" smtClean="0"/>
-              <a:t>9/25/2016</a:t>
+              <a:t>10/9/2016</a:t>
             </a:fld>
             <a:endParaRPr lang="en-US"/>
           </a:p>
@@ -3091,10 +3096,13 @@
             <a:avLst/>
           </a:prstGeom>
           <a:solidFill>
-            <a:schemeClr val="accent6">
-              <a:lumMod val="50000"/>
-            </a:schemeClr>
+            <a:schemeClr val="bg1"/>
           </a:solidFill>
+          <a:ln w="76200">
+            <a:solidFill>
+              <a:srgbClr val="00B050"/>
+            </a:solidFill>
+          </a:ln>
         </p:spPr>
         <p:style>
           <a:lnRef idx="2">
@@ -3118,10 +3126,18 @@
           <a:p>
             <a:pPr algn="ctr"/>
             <a:r>
-              <a:rPr lang="en-US" dirty="0" smtClean="0"/>
+              <a:rPr lang="en-US" dirty="0" smtClean="0">
+                <a:solidFill>
+                  <a:schemeClr val="tx1"/>
+                </a:solidFill>
+              </a:rPr>
               <a:t>Standby</a:t>
             </a:r>
-            <a:endParaRPr lang="en-US" dirty="0"/>
+            <a:endParaRPr lang="en-US" dirty="0">
+              <a:solidFill>
+                <a:schemeClr val="tx1"/>
+              </a:solidFill>
+            </a:endParaRPr>
           </a:p>
         </p:txBody>
       </p:sp>
@@ -3140,8 +3156,13 @@
             <a:avLst/>
           </a:prstGeom>
           <a:solidFill>
-            <a:srgbClr val="FF0000"/>
+            <a:schemeClr val="bg1"/>
           </a:solidFill>
+          <a:ln w="76200">
+            <a:solidFill>
+              <a:srgbClr val="FFC000"/>
+            </a:solidFill>
+          </a:ln>
         </p:spPr>
         <p:style>
           <a:lnRef idx="2">
@@ -3165,10 +3186,18 @@
           <a:p>
             <a:pPr algn="ctr"/>
             <a:r>
-              <a:rPr lang="en-US" dirty="0" smtClean="0"/>
+              <a:rPr lang="en-US" dirty="0" smtClean="0">
+                <a:solidFill>
+                  <a:schemeClr val="tx1"/>
+                </a:solidFill>
+              </a:rPr>
               <a:t>Receive corrected data structure</a:t>
             </a:r>
-            <a:endParaRPr lang="en-US" dirty="0"/>
+            <a:endParaRPr lang="en-US" dirty="0">
+              <a:solidFill>
+                <a:schemeClr val="tx1"/>
+              </a:solidFill>
+            </a:endParaRPr>
           </a:p>
         </p:txBody>
       </p:sp>
@@ -3325,6 +3354,14 @@
           <a:prstGeom prst="rect">
             <a:avLst/>
           </a:prstGeom>
+          <a:solidFill>
+            <a:schemeClr val="bg1"/>
+          </a:solidFill>
+          <a:ln w="76200">
+            <a:solidFill>
+              <a:srgbClr val="FFC000"/>
+            </a:solidFill>
+          </a:ln>
         </p:spPr>
         <p:style>
           <a:lnRef idx="2">
@@ -3348,10 +3385,18 @@
           <a:p>
             <a:pPr algn="ctr"/>
             <a:r>
-              <a:rPr lang="en-US" dirty="0" smtClean="0"/>
+              <a:rPr lang="en-US" dirty="0" smtClean="0">
+                <a:solidFill>
+                  <a:schemeClr val="tx1"/>
+                </a:solidFill>
+              </a:rPr>
               <a:t>Calculate lists of angle, angular acceleration, and angular jerk</a:t>
             </a:r>
-            <a:endParaRPr lang="en-US" dirty="0"/>
+            <a:endParaRPr lang="en-US" dirty="0">
+              <a:solidFill>
+                <a:schemeClr val="tx1"/>
+              </a:solidFill>
+            </a:endParaRPr>
           </a:p>
         </p:txBody>
       </p:sp>
@@ -3369,6 +3414,14 @@
           <a:prstGeom prst="rect">
             <a:avLst/>
           </a:prstGeom>
+          <a:solidFill>
+            <a:schemeClr val="bg1"/>
+          </a:solidFill>
+          <a:ln w="76200">
+            <a:solidFill>
+              <a:srgbClr val="FFC000"/>
+            </a:solidFill>
+          </a:ln>
         </p:spPr>
         <p:style>
           <a:lnRef idx="2">
@@ -3392,10 +3445,18 @@
           <a:p>
             <a:pPr algn="ctr"/>
             <a:r>
-              <a:rPr lang="en-US" dirty="0" smtClean="0"/>
+              <a:rPr lang="en-US" dirty="0" smtClean="0">
+                <a:solidFill>
+                  <a:schemeClr val="tx1"/>
+                </a:solidFill>
+              </a:rPr>
               <a:t>Compare against LBD severity model</a:t>
             </a:r>
-            <a:endParaRPr lang="en-US" dirty="0"/>
+            <a:endParaRPr lang="en-US" dirty="0">
+              <a:solidFill>
+                <a:schemeClr val="tx1"/>
+              </a:solidFill>
+            </a:endParaRPr>
           </a:p>
         </p:txBody>
       </p:sp>
@@ -3414,10 +3475,13 @@
             <a:avLst/>
           </a:prstGeom>
           <a:solidFill>
-            <a:schemeClr val="accent6">
-              <a:lumMod val="50000"/>
-            </a:schemeClr>
+            <a:schemeClr val="bg1"/>
           </a:solidFill>
+          <a:ln w="76200">
+            <a:solidFill>
+              <a:srgbClr val="00B050"/>
+            </a:solidFill>
+          </a:ln>
         </p:spPr>
         <p:style>
           <a:lnRef idx="2">
@@ -3441,10 +3505,18 @@
           <a:p>
             <a:pPr algn="ctr"/>
             <a:r>
-              <a:rPr lang="en-US" dirty="0" smtClean="0"/>
+              <a:rPr lang="en-US" dirty="0" smtClean="0">
+                <a:solidFill>
+                  <a:schemeClr val="tx1"/>
+                </a:solidFill>
+              </a:rPr>
               <a:t>Calculate closest level of LBD</a:t>
             </a:r>
-            <a:endParaRPr lang="en-US" dirty="0"/>
+            <a:endParaRPr lang="en-US" dirty="0">
+              <a:solidFill>
+                <a:schemeClr val="tx1"/>
+              </a:solidFill>
+            </a:endParaRPr>
           </a:p>
         </p:txBody>
       </p:sp>
@@ -3583,8 +3655,13 @@
             <a:avLst/>
           </a:prstGeom>
           <a:solidFill>
-            <a:srgbClr val="FF0000"/>
+            <a:schemeClr val="bg1"/>
           </a:solidFill>
+          <a:ln w="76200">
+            <a:solidFill>
+              <a:srgbClr val="FF0000"/>
+            </a:solidFill>
+          </a:ln>
         </p:spPr>
         <p:style>
           <a:lnRef idx="2">
@@ -3608,14 +3685,26 @@
           <a:p>
             <a:pPr algn="ctr"/>
             <a:r>
-              <a:rPr lang="en-US" dirty="0"/>
+              <a:rPr lang="en-US" dirty="0">
+                <a:solidFill>
+                  <a:schemeClr val="tx1"/>
+                </a:solidFill>
+              </a:rPr>
               <a:t>C</a:t>
             </a:r>
             <a:r>
-              <a:rPr lang="en-US" dirty="0" smtClean="0"/>
+              <a:rPr lang="en-US" dirty="0" smtClean="0">
+                <a:solidFill>
+                  <a:schemeClr val="tx1"/>
+                </a:solidFill>
+              </a:rPr>
               <a:t>alculate final severity across all trails</a:t>
             </a:r>
-            <a:endParaRPr lang="en-US" dirty="0"/>
+            <a:endParaRPr lang="en-US" dirty="0">
+              <a:solidFill>
+                <a:schemeClr val="tx1"/>
+              </a:solidFill>
+            </a:endParaRPr>
           </a:p>
         </p:txBody>
       </p:sp>
@@ -3633,6 +3722,14 @@
           <a:prstGeom prst="rect">
             <a:avLst/>
           </a:prstGeom>
+          <a:solidFill>
+            <a:schemeClr val="bg1"/>
+          </a:solidFill>
+          <a:ln w="76200">
+            <a:solidFill>
+              <a:srgbClr val="00B050"/>
+            </a:solidFill>
+          </a:ln>
         </p:spPr>
         <p:style>
           <a:lnRef idx="2">
@@ -3656,10 +3753,18 @@
           <a:p>
             <a:pPr algn="ctr"/>
             <a:r>
-              <a:rPr lang="en-US" dirty="0" smtClean="0"/>
+              <a:rPr lang="en-US" dirty="0" smtClean="0">
+                <a:solidFill>
+                  <a:schemeClr val="tx1"/>
+                </a:solidFill>
+              </a:rPr>
               <a:t>Generate Patient ID</a:t>
             </a:r>
-            <a:endParaRPr lang="en-US" dirty="0"/>
+            <a:endParaRPr lang="en-US" dirty="0">
+              <a:solidFill>
+                <a:schemeClr val="tx1"/>
+              </a:solidFill>
+            </a:endParaRPr>
           </a:p>
         </p:txBody>
       </p:sp>
@@ -3678,10 +3783,13 @@
             <a:avLst/>
           </a:prstGeom>
           <a:solidFill>
-            <a:schemeClr val="accent6">
-              <a:lumMod val="50000"/>
-            </a:schemeClr>
+            <a:schemeClr val="bg1"/>
           </a:solidFill>
+          <a:ln w="76200">
+            <a:solidFill>
+              <a:srgbClr val="00B050"/>
+            </a:solidFill>
+          </a:ln>
         </p:spPr>
         <p:style>
           <a:lnRef idx="2">
@@ -3705,10 +3813,18 @@
           <a:p>
             <a:pPr algn="ctr"/>
             <a:r>
-              <a:rPr lang="en-US" dirty="0" smtClean="0"/>
+              <a:rPr lang="en-US" dirty="0" smtClean="0">
+                <a:solidFill>
+                  <a:schemeClr val="tx1"/>
+                </a:solidFill>
+              </a:rPr>
               <a:t>Add supporting data and LBD severity to database</a:t>
             </a:r>
-            <a:endParaRPr lang="en-US" dirty="0"/>
+            <a:endParaRPr lang="en-US" dirty="0">
+              <a:solidFill>
+                <a:schemeClr val="tx1"/>
+              </a:solidFill>
+            </a:endParaRPr>
           </a:p>
         </p:txBody>
       </p:sp>
@@ -3757,10 +3873,13 @@
             <a:avLst/>
           </a:prstGeom>
           <a:solidFill>
-            <a:schemeClr val="accent6">
-              <a:lumMod val="50000"/>
-            </a:schemeClr>
+            <a:schemeClr val="bg1"/>
           </a:solidFill>
+          <a:ln w="76200">
+            <a:solidFill>
+              <a:srgbClr val="00B050"/>
+            </a:solidFill>
+          </a:ln>
         </p:spPr>
         <p:style>
           <a:lnRef idx="2">
@@ -3784,10 +3903,18 @@
           <a:p>
             <a:pPr algn="ctr"/>
             <a:r>
-              <a:rPr lang="en-US" dirty="0" smtClean="0"/>
+              <a:rPr lang="en-US" dirty="0" smtClean="0">
+                <a:solidFill>
+                  <a:schemeClr val="tx1"/>
+                </a:solidFill>
+              </a:rPr>
               <a:t>Completed</a:t>
             </a:r>
-            <a:endParaRPr lang="en-US" dirty="0"/>
+            <a:endParaRPr lang="en-US" dirty="0">
+              <a:solidFill>
+                <a:schemeClr val="tx1"/>
+              </a:solidFill>
+            </a:endParaRPr>
           </a:p>
         </p:txBody>
       </p:sp>
@@ -3806,8 +3933,13 @@
             <a:avLst/>
           </a:prstGeom>
           <a:solidFill>
-            <a:srgbClr val="FFC000"/>
+            <a:schemeClr val="bg1"/>
           </a:solidFill>
+          <a:ln w="76200">
+            <a:solidFill>
+              <a:srgbClr val="FFC000"/>
+            </a:solidFill>
+          </a:ln>
         </p:spPr>
         <p:style>
           <a:lnRef idx="2">
@@ -3831,10 +3963,18 @@
           <a:p>
             <a:pPr algn="ctr"/>
             <a:r>
-              <a:rPr lang="en-US" dirty="0" smtClean="0"/>
+              <a:rPr lang="en-US" dirty="0" smtClean="0">
+                <a:solidFill>
+                  <a:schemeClr val="tx1"/>
+                </a:solidFill>
+              </a:rPr>
               <a:t>In Progress</a:t>
             </a:r>
-            <a:endParaRPr lang="en-US" dirty="0"/>
+            <a:endParaRPr lang="en-US" dirty="0">
+              <a:solidFill>
+                <a:schemeClr val="tx1"/>
+              </a:solidFill>
+            </a:endParaRPr>
           </a:p>
         </p:txBody>
       </p:sp>
@@ -3853,8 +3993,13 @@
             <a:avLst/>
           </a:prstGeom>
           <a:solidFill>
-            <a:srgbClr val="FF0000"/>
+            <a:schemeClr val="bg1"/>
           </a:solidFill>
+          <a:ln w="76200">
+            <a:solidFill>
+              <a:srgbClr val="FF0000"/>
+            </a:solidFill>
+          </a:ln>
         </p:spPr>
         <p:style>
           <a:lnRef idx="2">
@@ -3878,10 +4023,18 @@
           <a:p>
             <a:pPr algn="ctr"/>
             <a:r>
-              <a:rPr lang="en-US" dirty="0" smtClean="0"/>
+              <a:rPr lang="en-US" dirty="0" smtClean="0">
+                <a:solidFill>
+                  <a:schemeClr val="tx1"/>
+                </a:solidFill>
+              </a:rPr>
               <a:t>Not started</a:t>
             </a:r>
-            <a:endParaRPr lang="en-US" dirty="0"/>
+            <a:endParaRPr lang="en-US" dirty="0">
+              <a:solidFill>
+                <a:schemeClr val="tx1"/>
+              </a:solidFill>
+            </a:endParaRPr>
           </a:p>
         </p:txBody>
       </p:sp>
@@ -4053,15 +4206,11 @@
             <a:avLst/>
           </a:prstGeom>
           <a:solidFill>
-            <a:schemeClr val="accent6">
-              <a:lumMod val="50000"/>
-            </a:schemeClr>
+            <a:schemeClr val="bg1"/>
           </a:solidFill>
-          <a:ln>
+          <a:ln w="76200">
             <a:solidFill>
-              <a:schemeClr val="accent6">
-                <a:lumMod val="50000"/>
-              </a:schemeClr>
+              <a:srgbClr val="00B050"/>
             </a:solidFill>
           </a:ln>
         </p:spPr>
@@ -4087,10 +4236,18 @@
           <a:p>
             <a:pPr algn="ctr"/>
             <a:r>
-              <a:rPr lang="en-US" dirty="0" smtClean="0"/>
+              <a:rPr lang="en-US" dirty="0" smtClean="0">
+                <a:solidFill>
+                  <a:schemeClr val="tx1"/>
+                </a:solidFill>
+              </a:rPr>
               <a:t>Output database information to DDI</a:t>
             </a:r>
-            <a:endParaRPr lang="en-US" dirty="0"/>
+            <a:endParaRPr lang="en-US" dirty="0">
+              <a:solidFill>
+                <a:schemeClr val="tx1"/>
+              </a:solidFill>
+            </a:endParaRPr>
           </a:p>
         </p:txBody>
       </p:sp>

</xml_diff>

<commit_message>
Updated VS project, and added updated flow charts and screenshots of flow charts
</commit_message>
<xml_diff>
--- a/AlexDubois/Updated Flowcharts.pptx
+++ b/AlexDubois/Updated Flowcharts.pptx
@@ -245,7 +245,7 @@
           <a:p>
             <a:fld id="{603601E7-32FD-41E4-B3D9-A9D98600A68F}" type="datetimeFigureOut">
               <a:rPr lang="en-US" smtClean="0"/>
-              <a:t>10/16/2016</a:t>
+              <a:t>10/30/2016</a:t>
             </a:fld>
             <a:endParaRPr lang="en-US"/>
           </a:p>
@@ -415,7 +415,7 @@
           <a:p>
             <a:fld id="{603601E7-32FD-41E4-B3D9-A9D98600A68F}" type="datetimeFigureOut">
               <a:rPr lang="en-US" smtClean="0"/>
-              <a:t>10/16/2016</a:t>
+              <a:t>10/30/2016</a:t>
             </a:fld>
             <a:endParaRPr lang="en-US"/>
           </a:p>
@@ -595,7 +595,7 @@
           <a:p>
             <a:fld id="{603601E7-32FD-41E4-B3D9-A9D98600A68F}" type="datetimeFigureOut">
               <a:rPr lang="en-US" smtClean="0"/>
-              <a:t>10/16/2016</a:t>
+              <a:t>10/30/2016</a:t>
             </a:fld>
             <a:endParaRPr lang="en-US"/>
           </a:p>
@@ -765,7 +765,7 @@
           <a:p>
             <a:fld id="{603601E7-32FD-41E4-B3D9-A9D98600A68F}" type="datetimeFigureOut">
               <a:rPr lang="en-US" smtClean="0"/>
-              <a:t>10/16/2016</a:t>
+              <a:t>10/30/2016</a:t>
             </a:fld>
             <a:endParaRPr lang="en-US"/>
           </a:p>
@@ -1011,7 +1011,7 @@
           <a:p>
             <a:fld id="{603601E7-32FD-41E4-B3D9-A9D98600A68F}" type="datetimeFigureOut">
               <a:rPr lang="en-US" smtClean="0"/>
-              <a:t>10/16/2016</a:t>
+              <a:t>10/30/2016</a:t>
             </a:fld>
             <a:endParaRPr lang="en-US"/>
           </a:p>
@@ -1243,7 +1243,7 @@
           <a:p>
             <a:fld id="{603601E7-32FD-41E4-B3D9-A9D98600A68F}" type="datetimeFigureOut">
               <a:rPr lang="en-US" smtClean="0"/>
-              <a:t>10/16/2016</a:t>
+              <a:t>10/30/2016</a:t>
             </a:fld>
             <a:endParaRPr lang="en-US"/>
           </a:p>
@@ -1610,7 +1610,7 @@
           <a:p>
             <a:fld id="{603601E7-32FD-41E4-B3D9-A9D98600A68F}" type="datetimeFigureOut">
               <a:rPr lang="en-US" smtClean="0"/>
-              <a:t>10/16/2016</a:t>
+              <a:t>10/30/2016</a:t>
             </a:fld>
             <a:endParaRPr lang="en-US"/>
           </a:p>
@@ -1728,7 +1728,7 @@
           <a:p>
             <a:fld id="{603601E7-32FD-41E4-B3D9-A9D98600A68F}" type="datetimeFigureOut">
               <a:rPr lang="en-US" smtClean="0"/>
-              <a:t>10/16/2016</a:t>
+              <a:t>10/30/2016</a:t>
             </a:fld>
             <a:endParaRPr lang="en-US"/>
           </a:p>
@@ -1823,7 +1823,7 @@
           <a:p>
             <a:fld id="{603601E7-32FD-41E4-B3D9-A9D98600A68F}" type="datetimeFigureOut">
               <a:rPr lang="en-US" smtClean="0"/>
-              <a:t>10/16/2016</a:t>
+              <a:t>10/30/2016</a:t>
             </a:fld>
             <a:endParaRPr lang="en-US"/>
           </a:p>
@@ -2100,7 +2100,7 @@
           <a:p>
             <a:fld id="{603601E7-32FD-41E4-B3D9-A9D98600A68F}" type="datetimeFigureOut">
               <a:rPr lang="en-US" smtClean="0"/>
-              <a:t>10/16/2016</a:t>
+              <a:t>10/30/2016</a:t>
             </a:fld>
             <a:endParaRPr lang="en-US"/>
           </a:p>
@@ -2353,7 +2353,7 @@
           <a:p>
             <a:fld id="{603601E7-32FD-41E4-B3D9-A9D98600A68F}" type="datetimeFigureOut">
               <a:rPr lang="en-US" smtClean="0"/>
-              <a:t>10/16/2016</a:t>
+              <a:t>10/30/2016</a:t>
             </a:fld>
             <a:endParaRPr lang="en-US"/>
           </a:p>
@@ -2566,7 +2566,7 @@
           <a:p>
             <a:fld id="{603601E7-32FD-41E4-B3D9-A9D98600A68F}" type="datetimeFigureOut">
               <a:rPr lang="en-US" smtClean="0"/>
-              <a:t>10/16/2016</a:t>
+              <a:t>10/30/2016</a:t>
             </a:fld>
             <a:endParaRPr lang="en-US"/>
           </a:p>
@@ -3161,7 +3161,7 @@
           </a:solidFill>
           <a:ln w="76200">
             <a:solidFill>
-              <a:srgbClr val="FFC000"/>
+              <a:srgbClr val="00B050"/>
             </a:solidFill>
           </a:ln>
         </p:spPr>
@@ -3360,7 +3360,7 @@
           </a:solidFill>
           <a:ln w="76200">
             <a:solidFill>
-              <a:srgbClr val="FFC000"/>
+              <a:srgbClr val="00B050"/>
             </a:solidFill>
           </a:ln>
         </p:spPr>
@@ -3660,7 +3660,7 @@
           </a:solidFill>
           <a:ln w="76200">
             <a:solidFill>
-              <a:srgbClr val="FF0000"/>
+              <a:srgbClr val="FFC000"/>
             </a:solidFill>
           </a:ln>
         </p:spPr>
@@ -3699,7 +3699,23 @@
                   <a:schemeClr val="tx1"/>
                 </a:solidFill>
               </a:rPr>
-              <a:t>alculate final severity across all trails</a:t>
+              <a:t>alculate final severity across </a:t>
+            </a:r>
+            <a:r>
+              <a:rPr lang="en-US" smtClean="0">
+                <a:solidFill>
+                  <a:schemeClr val="tx1"/>
+                </a:solidFill>
+              </a:rPr>
+              <a:t>all </a:t>
+            </a:r>
+            <a:r>
+              <a:rPr lang="en-US" smtClean="0">
+                <a:solidFill>
+                  <a:schemeClr val="tx1"/>
+                </a:solidFill>
+              </a:rPr>
+              <a:t>trials</a:t>
             </a:r>
             <a:endParaRPr lang="en-US" dirty="0">
               <a:solidFill>

</xml_diff>